<commit_message>
Terminando a seção de  operações morfologicas e tratamento de imagens. Começando a implementação do East.
</commit_message>
<xml_diff>
--- a/Presentation/week1.pptx
+++ b/Presentation/week1.pptx
@@ -106,6 +106,11 @@
       </a:defRPr>
     </a:lvl9pPr>
   </p:defaultTextStyle>
+  <p:extLst>
+    <p:ext uri="{EFAFB233-063F-42B5-8137-9DF3F51BA10A}">
+      <p15:sldGuideLst xmlns:p15="http://schemas.microsoft.com/office/powerpoint/2012/main"/>
+    </p:ext>
+  </p:extLst>
 </p:presentation>
 </file>
 
@@ -256,7 +261,7 @@
           <a:p>
             <a:fld id="{38BC2D61-AF60-4392-974D-4B56E6259BE8}" type="datetimeFigureOut">
               <a:rPr lang="pt-BR" smtClean="0"/>
-              <a:t>24/02/2023</a:t>
+              <a:t>27/02/2023</a:t>
             </a:fld>
             <a:endParaRPr lang="pt-BR"/>
           </a:p>
@@ -454,7 +459,7 @@
           <a:p>
             <a:fld id="{38BC2D61-AF60-4392-974D-4B56E6259BE8}" type="datetimeFigureOut">
               <a:rPr lang="pt-BR" smtClean="0"/>
-              <a:t>24/02/2023</a:t>
+              <a:t>27/02/2023</a:t>
             </a:fld>
             <a:endParaRPr lang="pt-BR"/>
           </a:p>
@@ -662,7 +667,7 @@
           <a:p>
             <a:fld id="{38BC2D61-AF60-4392-974D-4B56E6259BE8}" type="datetimeFigureOut">
               <a:rPr lang="pt-BR" smtClean="0"/>
-              <a:t>24/02/2023</a:t>
+              <a:t>27/02/2023</a:t>
             </a:fld>
             <a:endParaRPr lang="pt-BR"/>
           </a:p>
@@ -860,7 +865,7 @@
           <a:p>
             <a:fld id="{38BC2D61-AF60-4392-974D-4B56E6259BE8}" type="datetimeFigureOut">
               <a:rPr lang="pt-BR" smtClean="0"/>
-              <a:t>24/02/2023</a:t>
+              <a:t>27/02/2023</a:t>
             </a:fld>
             <a:endParaRPr lang="pt-BR"/>
           </a:p>
@@ -1135,7 +1140,7 @@
           <a:p>
             <a:fld id="{38BC2D61-AF60-4392-974D-4B56E6259BE8}" type="datetimeFigureOut">
               <a:rPr lang="pt-BR" smtClean="0"/>
-              <a:t>24/02/2023</a:t>
+              <a:t>27/02/2023</a:t>
             </a:fld>
             <a:endParaRPr lang="pt-BR"/>
           </a:p>
@@ -1400,7 +1405,7 @@
           <a:p>
             <a:fld id="{38BC2D61-AF60-4392-974D-4B56E6259BE8}" type="datetimeFigureOut">
               <a:rPr lang="pt-BR" smtClean="0"/>
-              <a:t>24/02/2023</a:t>
+              <a:t>27/02/2023</a:t>
             </a:fld>
             <a:endParaRPr lang="pt-BR"/>
           </a:p>
@@ -1812,7 +1817,7 @@
           <a:p>
             <a:fld id="{38BC2D61-AF60-4392-974D-4B56E6259BE8}" type="datetimeFigureOut">
               <a:rPr lang="pt-BR" smtClean="0"/>
-              <a:t>24/02/2023</a:t>
+              <a:t>27/02/2023</a:t>
             </a:fld>
             <a:endParaRPr lang="pt-BR"/>
           </a:p>
@@ -1953,7 +1958,7 @@
           <a:p>
             <a:fld id="{38BC2D61-AF60-4392-974D-4B56E6259BE8}" type="datetimeFigureOut">
               <a:rPr lang="pt-BR" smtClean="0"/>
-              <a:t>24/02/2023</a:t>
+              <a:t>27/02/2023</a:t>
             </a:fld>
             <a:endParaRPr lang="pt-BR"/>
           </a:p>
@@ -2066,7 +2071,7 @@
           <a:p>
             <a:fld id="{38BC2D61-AF60-4392-974D-4B56E6259BE8}" type="datetimeFigureOut">
               <a:rPr lang="pt-BR" smtClean="0"/>
-              <a:t>24/02/2023</a:t>
+              <a:t>27/02/2023</a:t>
             </a:fld>
             <a:endParaRPr lang="pt-BR"/>
           </a:p>
@@ -2377,7 +2382,7 @@
           <a:p>
             <a:fld id="{38BC2D61-AF60-4392-974D-4B56E6259BE8}" type="datetimeFigureOut">
               <a:rPr lang="pt-BR" smtClean="0"/>
-              <a:t>24/02/2023</a:t>
+              <a:t>27/02/2023</a:t>
             </a:fld>
             <a:endParaRPr lang="pt-BR"/>
           </a:p>
@@ -2665,7 +2670,7 @@
           <a:p>
             <a:fld id="{38BC2D61-AF60-4392-974D-4B56E6259BE8}" type="datetimeFigureOut">
               <a:rPr lang="pt-BR" smtClean="0"/>
-              <a:t>24/02/2023</a:t>
+              <a:t>27/02/2023</a:t>
             </a:fld>
             <a:endParaRPr lang="pt-BR"/>
           </a:p>
@@ -2906,7 +2911,7 @@
           <a:p>
             <a:fld id="{38BC2D61-AF60-4392-974D-4B56E6259BE8}" type="datetimeFigureOut">
               <a:rPr lang="pt-BR" smtClean="0"/>
-              <a:t>24/02/2023</a:t>
+              <a:t>27/02/2023</a:t>
             </a:fld>
             <a:endParaRPr lang="pt-BR"/>
           </a:p>
@@ -3970,18 +3975,12 @@
             </a:r>
           </a:p>
           <a:p>
-            <a:pPr indent="-228600" algn="l">
-              <a:buFont typeface="Arial" panose="020B0604020202020204" pitchFamily="34" charset="0"/>
-              <a:buChar char="•"/>
-            </a:pPr>
-            <a:r>
-              <a:rPr lang="en-US" sz="2000" dirty="0">
-                <a:solidFill>
-                  <a:schemeClr val="bg1"/>
-                </a:solidFill>
-              </a:rPr>
-              <a:t>Agile Methodology</a:t>
-            </a:r>
+            <a:pPr algn="l"/>
+            <a:endParaRPr lang="en-US" sz="2000" b="1" dirty="0">
+              <a:solidFill>
+                <a:schemeClr val="bg1"/>
+              </a:solidFill>
+            </a:endParaRPr>
           </a:p>
           <a:p>
             <a:pPr indent="-228600" algn="l">
@@ -3995,6 +3994,138 @@
             </a:endParaRPr>
           </a:p>
           <a:p>
+            <a:pPr algn="l"/>
+            <a:endParaRPr lang="en-US" sz="2000" b="1" dirty="0">
+              <a:solidFill>
+                <a:schemeClr val="bg1"/>
+              </a:solidFill>
+            </a:endParaRPr>
+          </a:p>
+          <a:p>
+            <a:pPr algn="l"/>
+            <a:endParaRPr lang="en-US" sz="2000" b="1" dirty="0">
+              <a:solidFill>
+                <a:schemeClr val="bg1"/>
+              </a:solidFill>
+            </a:endParaRPr>
+          </a:p>
+          <a:p>
+            <a:pPr algn="l"/>
+            <a:r>
+              <a:rPr lang="en-US" sz="2000" b="1" dirty="0">
+                <a:solidFill>
+                  <a:schemeClr val="bg1"/>
+                </a:solidFill>
+              </a:rPr>
+              <a:t>Technologies</a:t>
+            </a:r>
+          </a:p>
+          <a:p>
+            <a:pPr indent="-228600" algn="l">
+              <a:buFont typeface="Arial" panose="020B0604020202020204" pitchFamily="34" charset="0"/>
+              <a:buChar char="•"/>
+            </a:pPr>
+            <a:r>
+              <a:rPr lang="en-US" sz="2000" dirty="0">
+                <a:solidFill>
+                  <a:schemeClr val="bg1"/>
+                </a:solidFill>
+              </a:rPr>
+              <a:t>Python</a:t>
+            </a:r>
+          </a:p>
+          <a:p>
+            <a:pPr indent="-228600" algn="l">
+              <a:buFont typeface="Arial" panose="020B0604020202020204" pitchFamily="34" charset="0"/>
+              <a:buChar char="•"/>
+            </a:pPr>
+            <a:r>
+              <a:rPr lang="en-US" sz="2000" dirty="0" err="1">
+                <a:solidFill>
+                  <a:schemeClr val="bg1"/>
+                </a:solidFill>
+              </a:rPr>
+              <a:t>MySql</a:t>
+            </a:r>
+            <a:endParaRPr lang="en-US" sz="2000" dirty="0">
+              <a:solidFill>
+                <a:schemeClr val="bg1"/>
+              </a:solidFill>
+            </a:endParaRPr>
+          </a:p>
+          <a:p>
+            <a:pPr indent="-228600" algn="l">
+              <a:buFont typeface="Arial" panose="020B0604020202020204" pitchFamily="34" charset="0"/>
+              <a:buChar char="•"/>
+            </a:pPr>
+            <a:r>
+              <a:rPr lang="en-US" sz="2000" dirty="0">
+                <a:solidFill>
+                  <a:schemeClr val="bg1"/>
+                </a:solidFill>
+              </a:rPr>
+              <a:t>NodeJS</a:t>
+            </a:r>
+          </a:p>
+          <a:p>
+            <a:pPr indent="-228600" algn="l">
+              <a:buFont typeface="Arial" panose="020B0604020202020204" pitchFamily="34" charset="0"/>
+              <a:buChar char="•"/>
+            </a:pPr>
+            <a:r>
+              <a:rPr lang="en-US" sz="2000" dirty="0">
+                <a:solidFill>
+                  <a:schemeClr val="bg1"/>
+                </a:solidFill>
+              </a:rPr>
+              <a:t>Angular</a:t>
+            </a:r>
+          </a:p>
+          <a:p>
+            <a:pPr indent="-228600" algn="l">
+              <a:buFont typeface="Arial" panose="020B0604020202020204" pitchFamily="34" charset="0"/>
+              <a:buChar char="•"/>
+            </a:pPr>
+            <a:endParaRPr lang="en-US" sz="2000" dirty="0">
+              <a:solidFill>
+                <a:schemeClr val="bg1"/>
+              </a:solidFill>
+            </a:endParaRPr>
+          </a:p>
+          <a:p>
+            <a:pPr indent="-228600" algn="l">
+              <a:buFont typeface="Arial" panose="020B0604020202020204" pitchFamily="34" charset="0"/>
+              <a:buChar char="•"/>
+            </a:pPr>
+            <a:endParaRPr lang="en-US" sz="2000" dirty="0">
+              <a:solidFill>
+                <a:schemeClr val="bg1"/>
+              </a:solidFill>
+            </a:endParaRPr>
+          </a:p>
+          <a:p>
+            <a:pPr indent="-228600" algn="l">
+              <a:buFont typeface="Arial" panose="020B0604020202020204" pitchFamily="34" charset="0"/>
+              <a:buChar char="•"/>
+            </a:pPr>
+            <a:endParaRPr lang="en-US" sz="2000" dirty="0">
+              <a:solidFill>
+                <a:schemeClr val="bg1"/>
+              </a:solidFill>
+            </a:endParaRPr>
+          </a:p>
+          <a:p>
+            <a:pPr indent="-228600" algn="l">
+              <a:buFont typeface="Arial" panose="020B0604020202020204" pitchFamily="34" charset="0"/>
+              <a:buChar char="•"/>
+            </a:pPr>
+            <a:endParaRPr lang="en-US" sz="2000" dirty="0">
+              <a:solidFill>
+                <a:schemeClr val="bg1"/>
+              </a:solidFill>
+            </a:endParaRPr>
+          </a:p>
+          <a:p>
             <a:pPr indent="-228600" algn="l">
               <a:buFont typeface="Arial" panose="020B0604020202020204" pitchFamily="34" charset="0"/>
               <a:buChar char="•"/>
@@ -4005,119 +4136,6 @@
               </a:solidFill>
             </a:endParaRPr>
           </a:p>
-          <a:p>
-            <a:pPr algn="l"/>
-            <a:r>
-              <a:rPr lang="en-US" sz="2000" b="1" dirty="0">
-                <a:solidFill>
-                  <a:schemeClr val="bg1"/>
-                </a:solidFill>
-              </a:rPr>
-              <a:t>Technologies</a:t>
-            </a:r>
-          </a:p>
-          <a:p>
-            <a:pPr indent="-228600" algn="l">
-              <a:buFont typeface="Arial" panose="020B0604020202020204" pitchFamily="34" charset="0"/>
-              <a:buChar char="•"/>
-            </a:pPr>
-            <a:r>
-              <a:rPr lang="en-US" sz="2000" dirty="0">
-                <a:solidFill>
-                  <a:schemeClr val="bg1"/>
-                </a:solidFill>
-              </a:rPr>
-              <a:t>Python</a:t>
-            </a:r>
-          </a:p>
-          <a:p>
-            <a:pPr indent="-228600" algn="l">
-              <a:buFont typeface="Arial" panose="020B0604020202020204" pitchFamily="34" charset="0"/>
-              <a:buChar char="•"/>
-            </a:pPr>
-            <a:r>
-              <a:rPr lang="en-US" sz="2000" dirty="0" err="1">
-                <a:solidFill>
-                  <a:schemeClr val="bg1"/>
-                </a:solidFill>
-              </a:rPr>
-              <a:t>MySql</a:t>
-            </a:r>
-            <a:endParaRPr lang="en-US" sz="2000" dirty="0">
-              <a:solidFill>
-                <a:schemeClr val="bg1"/>
-              </a:solidFill>
-            </a:endParaRPr>
-          </a:p>
-          <a:p>
-            <a:pPr indent="-228600" algn="l">
-              <a:buFont typeface="Arial" panose="020B0604020202020204" pitchFamily="34" charset="0"/>
-              <a:buChar char="•"/>
-            </a:pPr>
-            <a:r>
-              <a:rPr lang="en-US" sz="2000" dirty="0">
-                <a:solidFill>
-                  <a:schemeClr val="bg1"/>
-                </a:solidFill>
-              </a:rPr>
-              <a:t>NodeJS</a:t>
-            </a:r>
-          </a:p>
-          <a:p>
-            <a:pPr indent="-228600" algn="l">
-              <a:buFont typeface="Arial" panose="020B0604020202020204" pitchFamily="34" charset="0"/>
-              <a:buChar char="•"/>
-            </a:pPr>
-            <a:endParaRPr lang="en-US" sz="2000" dirty="0">
-              <a:solidFill>
-                <a:schemeClr val="bg1"/>
-              </a:solidFill>
-            </a:endParaRPr>
-          </a:p>
-          <a:p>
-            <a:pPr indent="-228600" algn="l">
-              <a:buFont typeface="Arial" panose="020B0604020202020204" pitchFamily="34" charset="0"/>
-              <a:buChar char="•"/>
-            </a:pPr>
-            <a:endParaRPr lang="en-US" sz="2000" dirty="0">
-              <a:solidFill>
-                <a:schemeClr val="bg1"/>
-              </a:solidFill>
-            </a:endParaRPr>
-          </a:p>
-          <a:p>
-            <a:pPr indent="-228600" algn="l">
-              <a:buFont typeface="Arial" panose="020B0604020202020204" pitchFamily="34" charset="0"/>
-              <a:buChar char="•"/>
-            </a:pPr>
-            <a:endParaRPr lang="en-US" sz="2000" dirty="0">
-              <a:solidFill>
-                <a:schemeClr val="bg1"/>
-              </a:solidFill>
-            </a:endParaRPr>
-          </a:p>
-          <a:p>
-            <a:pPr indent="-228600" algn="l">
-              <a:buFont typeface="Arial" panose="020B0604020202020204" pitchFamily="34" charset="0"/>
-              <a:buChar char="•"/>
-            </a:pPr>
-            <a:endParaRPr lang="en-US" sz="2000" dirty="0">
-              <a:solidFill>
-                <a:schemeClr val="bg1"/>
-              </a:solidFill>
-            </a:endParaRPr>
-          </a:p>
-          <a:p>
-            <a:pPr indent="-228600" algn="l">
-              <a:buFont typeface="Arial" panose="020B0604020202020204" pitchFamily="34" charset="0"/>
-              <a:buChar char="•"/>
-            </a:pPr>
-            <a:endParaRPr lang="en-US" sz="2000" b="1" dirty="0">
-              <a:solidFill>
-                <a:schemeClr val="bg1"/>
-              </a:solidFill>
-            </a:endParaRPr>
-          </a:p>
         </p:txBody>
       </p:sp>
       <p:pic>
@@ -4151,7 +4169,7 @@
         </p:blipFill>
         <p:spPr>
           <a:xfrm>
-            <a:off x="6201764" y="903730"/>
+            <a:off x="6242861" y="933454"/>
             <a:ext cx="4472307" cy="4472307"/>
           </a:xfrm>
           <a:prstGeom prst="rect">

</xml_diff>